<commit_message>
Reworked apps to comply with KrakenD requirements
</commit_message>
<xml_diff>
--- a/rvstore_hackathon/Docker-RV Store Hackathon.pptx
+++ b/rvstore_hackathon/Docker-RV Store Hackathon.pptx
@@ -4688,7 +4688,7 @@
                 </a:solidFill>
                 <a:latin typeface="Raleway Medium" panose="020B0603030101060003" pitchFamily="34" charset="77"/>
               </a:rPr>
-              <a:t>-origin="*”</a:t>
+              <a:t>-origin=*</a:t>
             </a:r>
           </a:p>
           <a:p>
@@ -4712,7 +4712,7 @@
                 </a:solidFill>
                 <a:latin typeface="Raleway Medium" panose="020B0603030101060003" pitchFamily="34" charset="77"/>
               </a:rPr>
-              <a:t>=“true”</a:t>
+              <a:t>=true</a:t>
             </a:r>
           </a:p>
           <a:p>
@@ -4760,7 +4760,7 @@
                 </a:solidFill>
                 <a:latin typeface="Raleway Medium" panose="020B0603030101060003" pitchFamily="34" charset="77"/>
               </a:rPr>
-              <a:t>-credentials="true"</a:t>
+              <a:t>-credentials=true</a:t>
             </a:r>
           </a:p>
         </p:txBody>
@@ -9496,7 +9496,7 @@
                 </a:solidFill>
                 <a:latin typeface="Raleway Medium" panose="020B0603030101060003" pitchFamily="34" charset="77"/>
               </a:rPr>
-              <a:t>ENVIRONMENT: “containerized”</a:t>
+              <a:t>ENVIRONMENT: containerized</a:t>
             </a:r>
           </a:p>
           <a:p>

</xml_diff>